<commit_message>
Minor slide update to image positioning.
</commit_message>
<xml_diff>
--- a/2014-oss/day-09/Workflows.pptx
+++ b/2014-oss/day-09/Workflows.pptx
@@ -7447,7 +7447,6 @@
               <a:rPr lang="en-US" dirty="0" smtClean="0"/>
               <a:t>Repeatability</a:t>
             </a:r>
-            <a:endParaRPr lang="en-US" dirty="0" smtClean="0"/>
           </a:p>
           <a:p>
             <a:r>
@@ -7463,7 +7462,6 @@
               <a:rPr lang="en-US" dirty="0" smtClean="0"/>
               <a:t>Transparency</a:t>
             </a:r>
-            <a:endParaRPr lang="en-US" dirty="0" smtClean="0"/>
           </a:p>
           <a:p>
             <a:r>
@@ -7740,11 +7738,7 @@
             </a:r>
             <a:r>
               <a:rPr lang="en-US" dirty="0" smtClean="0"/>
-              <a:t>, Galaxy, </a:t>
-            </a:r>
-            <a:r>
-              <a:rPr lang="en-US" dirty="0" smtClean="0"/>
-              <a:t>and others</a:t>
+              <a:t>, Galaxy, and others</a:t>
             </a:r>
           </a:p>
         </p:txBody>
@@ -8886,11 +8880,7 @@
             </a:pPr>
             <a:r>
               <a:rPr lang="en-US" dirty="0" smtClean="0"/>
-              <a:t>Workflows in Open </a:t>
-            </a:r>
-            <a:r>
-              <a:rPr lang="en-US" dirty="0" smtClean="0"/>
-              <a:t>Science</a:t>
+              <a:t>Workflows in Open Science</a:t>
             </a:r>
           </a:p>
         </p:txBody>
@@ -10046,7 +10036,6 @@
               <a:rPr lang="en-US" sz="2800" i="1" u="sng" dirty="0" smtClean="0"/>
               <a:t>what is done</a:t>
             </a:r>
-            <a:endParaRPr lang="en-US" sz="2800" i="1" u="sng" dirty="0" smtClean="0"/>
           </a:p>
           <a:p>
             <a:pPr>
@@ -10060,7 +10049,6 @@
               <a:rPr lang="en-US" sz="2800" i="1" u="sng" dirty="0" smtClean="0"/>
               <a:t>how</a:t>
             </a:r>
-            <a:endParaRPr lang="en-US" sz="2800" i="1" u="sng" dirty="0" smtClean="0"/>
           </a:p>
           <a:p>
             <a:endParaRPr lang="en-US" sz="2800" dirty="0" smtClean="0"/>
@@ -10082,11 +10070,7 @@
             <a:pPr lvl="1"/>
             <a:r>
               <a:rPr lang="en-US" sz="2400" dirty="0" smtClean="0"/>
-              <a:t>Enables </a:t>
-            </a:r>
-            <a:r>
-              <a:rPr lang="en-US" sz="2400" dirty="0" smtClean="0"/>
-              <a:t>reuse</a:t>
+              <a:t>Enables reuse</a:t>
             </a:r>
           </a:p>
           <a:p>
@@ -11109,6 +11093,60 @@
           </p:txBody>
         </p:sp>
       </p:grpSp>
+      <p:pic>
+        <p:nvPicPr>
+          <p:cNvPr id="24" name="Picture 14"/>
+          <p:cNvPicPr>
+            <a:picLocks noChangeAspect="1" noChangeArrowheads="1"/>
+          </p:cNvPicPr>
+          <p:nvPr/>
+        </p:nvPicPr>
+        <p:blipFill>
+          <a:blip r:embed="rId3">
+            <a:extLst>
+              <a:ext uri="{28A0092B-C50C-407E-A947-70E740481C1C}">
+                <a14:useLocalDpi xmlns:a14="http://schemas.microsoft.com/office/drawing/2010/main" val="0"/>
+              </a:ext>
+            </a:extLst>
+          </a:blip>
+          <a:srcRect/>
+          <a:stretch>
+            <a:fillRect/>
+          </a:stretch>
+        </p:blipFill>
+        <p:spPr bwMode="auto">
+          <a:xfrm>
+            <a:off x="6667500" y="1320800"/>
+            <a:ext cx="1993900" cy="931863"/>
+          </a:xfrm>
+          <a:prstGeom prst="rect">
+            <a:avLst/>
+          </a:prstGeom>
+          <a:noFill/>
+          <a:ln>
+            <a:noFill/>
+          </a:ln>
+          <a:extLst>
+            <a:ext uri="{909E8E84-426E-40dd-AFC4-6F175D3DCCD1}">
+              <a14:hiddenFill xmlns:a14="http://schemas.microsoft.com/office/drawing/2010/main">
+                <a:solidFill>
+                  <a:srgbClr val="FFFFFF"/>
+                </a:solidFill>
+              </a14:hiddenFill>
+            </a:ext>
+            <a:ext uri="{91240B29-F687-4f45-9708-019B960494DF}">
+              <a14:hiddenLine xmlns:a14="http://schemas.microsoft.com/office/drawing/2010/main" w="12700">
+                <a:solidFill>
+                  <a:schemeClr val="tx1"/>
+                </a:solidFill>
+                <a:round/>
+                <a:headEnd/>
+                <a:tailEnd/>
+              </a14:hiddenLine>
+            </a:ext>
+          </a:extLst>
+        </p:spPr>
+      </p:pic>
     </p:spTree>
     <p:extLst>
       <p:ext uri="{BB962C8B-B14F-4D97-AF65-F5344CB8AC3E}">

</xml_diff>